<commit_message>
Updated slides for first weeks
</commit_message>
<xml_diff>
--- a/files/XSS.pptx
+++ b/files/XSS.pptx
@@ -5,7 +5,7 @@
     <p:sldMasterId id="2147483648" r:id="rId1"/>
   </p:sldMasterIdLst>
   <p:notesMasterIdLst>
-    <p:notesMasterId r:id="rId15"/>
+    <p:notesMasterId r:id="rId17"/>
   </p:notesMasterIdLst>
   <p:sldIdLst>
     <p:sldId id="266" r:id="rId2"/>
@@ -18,9 +18,11 @@
     <p:sldId id="257" r:id="rId9"/>
     <p:sldId id="277" r:id="rId10"/>
     <p:sldId id="283" r:id="rId11"/>
-    <p:sldId id="259" r:id="rId12"/>
-    <p:sldId id="284" r:id="rId13"/>
-    <p:sldId id="292" r:id="rId14"/>
+    <p:sldId id="306" r:id="rId12"/>
+    <p:sldId id="307" r:id="rId13"/>
+    <p:sldId id="259" r:id="rId14"/>
+    <p:sldId id="284" r:id="rId15"/>
+    <p:sldId id="292" r:id="rId16"/>
   </p:sldIdLst>
   <p:sldSz cx="12192000" cy="6858000"/>
   <p:notesSz cx="6858000" cy="9144000"/>
@@ -127,6 +129,15 @@
 </p:presentation>
 </file>
 
+<file path=ppt/revisionInfo.xml><?xml version="1.0" encoding="utf-8"?>
+<p1510:revInfo xmlns:a="http://schemas.openxmlformats.org/drawingml/2006/main" xmlns:r="http://schemas.openxmlformats.org/officeDocument/2006/relationships" xmlns:p1510="http://schemas.microsoft.com/office/powerpoint/2015/10/main">
+  <p1510:revLst>
+    <p1510:client id="{9B980F34-BD7C-E691-FED2-00C0AC293DF8}" v="3" dt="2024-11-24T12:03:18.078"/>
+    <p1510:client id="{9C2D4D29-5A55-8996-FE4F-D3606062915A}" v="7" dt="2024-11-23T16:38:08.543"/>
+  </p1510:revLst>
+</p1510:revInfo>
+</file>
+
 <file path=ppt/notesMasters/notesMaster1.xml><?xml version="1.0" encoding="utf-8"?>
 <p:notesMaster xmlns:a="http://schemas.openxmlformats.org/drawingml/2006/main" xmlns:r="http://schemas.openxmlformats.org/officeDocument/2006/relationships" xmlns:p="http://schemas.openxmlformats.org/presentationml/2006/main">
   <p:cSld>
@@ -209,7 +220,7 @@
           <a:p>
             <a:fld id="{A9881B1C-CF05-0F44-A33E-A38439A627E4}" type="datetimeFigureOut">
               <a:rPr lang="en-IL" smtClean="0"/>
-              <a:t>16/06/2024</a:t>
+              <a:t>11/24/2024</a:t>
             </a:fld>
             <a:endParaRPr lang="en-IL"/>
           </a:p>
@@ -1047,7 +1058,7 @@
           <a:p>
             <a:fld id="{C2E715B0-74F3-B64E-A730-C7F3E6BEB915}" type="slidenum">
               <a:rPr lang="en-IL" smtClean="0"/>
-              <a:t>13</a:t>
+              <a:t>15</a:t>
             </a:fld>
             <a:endParaRPr lang="en-IL"/>
           </a:p>
@@ -1215,7 +1226,7 @@
           <a:p>
             <a:fld id="{01F9F28E-B300-B343-AE70-8AAEBE22BCA3}" type="datetimeFigureOut">
               <a:rPr lang="en-IL" smtClean="0"/>
-              <a:t>16/06/2024</a:t>
+              <a:t>11/24/2024</a:t>
             </a:fld>
             <a:endParaRPr lang="en-IL"/>
           </a:p>
@@ -1415,7 +1426,7 @@
           <a:p>
             <a:fld id="{01F9F28E-B300-B343-AE70-8AAEBE22BCA3}" type="datetimeFigureOut">
               <a:rPr lang="en-IL" smtClean="0"/>
-              <a:t>16/06/2024</a:t>
+              <a:t>11/24/2024</a:t>
             </a:fld>
             <a:endParaRPr lang="en-IL"/>
           </a:p>
@@ -1625,7 +1636,7 @@
           <a:p>
             <a:fld id="{01F9F28E-B300-B343-AE70-8AAEBE22BCA3}" type="datetimeFigureOut">
               <a:rPr lang="en-IL" smtClean="0"/>
-              <a:t>16/06/2024</a:t>
+              <a:t>11/24/2024</a:t>
             </a:fld>
             <a:endParaRPr lang="en-IL"/>
           </a:p>
@@ -1825,7 +1836,7 @@
           <a:p>
             <a:fld id="{01F9F28E-B300-B343-AE70-8AAEBE22BCA3}" type="datetimeFigureOut">
               <a:rPr lang="en-IL" smtClean="0"/>
-              <a:t>16/06/2024</a:t>
+              <a:t>11/24/2024</a:t>
             </a:fld>
             <a:endParaRPr lang="en-IL"/>
           </a:p>
@@ -2101,7 +2112,7 @@
           <a:p>
             <a:fld id="{01F9F28E-B300-B343-AE70-8AAEBE22BCA3}" type="datetimeFigureOut">
               <a:rPr lang="en-IL" smtClean="0"/>
-              <a:t>16/06/2024</a:t>
+              <a:t>11/24/2024</a:t>
             </a:fld>
             <a:endParaRPr lang="en-IL"/>
           </a:p>
@@ -2369,7 +2380,7 @@
           <a:p>
             <a:fld id="{01F9F28E-B300-B343-AE70-8AAEBE22BCA3}" type="datetimeFigureOut">
               <a:rPr lang="en-IL" smtClean="0"/>
-              <a:t>16/06/2024</a:t>
+              <a:t>11/24/2024</a:t>
             </a:fld>
             <a:endParaRPr lang="en-IL"/>
           </a:p>
@@ -2784,7 +2795,7 @@
           <a:p>
             <a:fld id="{01F9F28E-B300-B343-AE70-8AAEBE22BCA3}" type="datetimeFigureOut">
               <a:rPr lang="en-IL" smtClean="0"/>
-              <a:t>16/06/2024</a:t>
+              <a:t>11/24/2024</a:t>
             </a:fld>
             <a:endParaRPr lang="en-IL"/>
           </a:p>
@@ -2926,7 +2937,7 @@
           <a:p>
             <a:fld id="{01F9F28E-B300-B343-AE70-8AAEBE22BCA3}" type="datetimeFigureOut">
               <a:rPr lang="en-IL" smtClean="0"/>
-              <a:t>16/06/2024</a:t>
+              <a:t>11/24/2024</a:t>
             </a:fld>
             <a:endParaRPr lang="en-IL"/>
           </a:p>
@@ -3039,7 +3050,7 @@
           <a:p>
             <a:fld id="{01F9F28E-B300-B343-AE70-8AAEBE22BCA3}" type="datetimeFigureOut">
               <a:rPr lang="en-IL" smtClean="0"/>
-              <a:t>16/06/2024</a:t>
+              <a:t>11/24/2024</a:t>
             </a:fld>
             <a:endParaRPr lang="en-IL"/>
           </a:p>
@@ -3352,7 +3363,7 @@
           <a:p>
             <a:fld id="{01F9F28E-B300-B343-AE70-8AAEBE22BCA3}" type="datetimeFigureOut">
               <a:rPr lang="en-IL" smtClean="0"/>
-              <a:t>16/06/2024</a:t>
+              <a:t>11/24/2024</a:t>
             </a:fld>
             <a:endParaRPr lang="en-IL"/>
           </a:p>
@@ -3641,7 +3652,7 @@
           <a:p>
             <a:fld id="{01F9F28E-B300-B343-AE70-8AAEBE22BCA3}" type="datetimeFigureOut">
               <a:rPr lang="en-IL" smtClean="0"/>
-              <a:t>16/06/2024</a:t>
+              <a:t>11/24/2024</a:t>
             </a:fld>
             <a:endParaRPr lang="en-IL"/>
           </a:p>
@@ -3884,7 +3895,7 @@
           <a:p>
             <a:fld id="{01F9F28E-B300-B343-AE70-8AAEBE22BCA3}" type="datetimeFigureOut">
               <a:rPr lang="en-IL" smtClean="0"/>
-              <a:t>16/06/2024</a:t>
+              <a:t>11/24/2024</a:t>
             </a:fld>
             <a:endParaRPr lang="en-IL"/>
           </a:p>
@@ -4353,8 +4364,8 @@
         </p:blipFill>
         <p:spPr>
           <a:xfrm>
-            <a:off x="8170096" y="2004365"/>
-            <a:ext cx="1998805" cy="3028493"/>
+            <a:off x="8232726" y="2004365"/>
+            <a:ext cx="1403819" cy="2214302"/>
           </a:xfrm>
           <a:prstGeom prst="rect">
             <a:avLst/>
@@ -4384,7 +4395,7 @@
           <a:noFill/>
         </p:spPr>
         <p:txBody>
-          <a:bodyPr wrap="square" rtlCol="0">
+          <a:bodyPr wrap="square" lIns="91440" tIns="45720" rIns="91440" bIns="45720" rtlCol="0" anchor="t">
             <a:spAutoFit/>
           </a:bodyPr>
           <a:lstStyle/>
@@ -4395,22 +4406,22 @@
               </a:lnSpc>
             </a:pPr>
             <a:r>
-              <a:rPr lang="en-US" sz="7200" b="1" spc="300" dirty="0">
+              <a:rPr lang="en-US" sz="5400" b="1" spc="300" dirty="0">
                 <a:solidFill>
                   <a:srgbClr val="E1FD21"/>
                 </a:solidFill>
-                <a:latin typeface="Handjet SemiBold Square Single" pitchFamily="2" charset="0"/>
+                <a:latin typeface="Handjet SemiBold Square Single"/>
                 <a:ea typeface="3270 CONDENSED" panose="02000509000000000000" pitchFamily="49" charset="0"/>
                 <a:cs typeface="Handjet SemiBold Square Single" pitchFamily="2" charset="0"/>
               </a:rPr>
               <a:t>Understanding Cross-Site Scripting (XSS)</a:t>
             </a:r>
-            <a:endParaRPr lang="he-IL" sz="7200" b="1" spc="300" dirty="0">
+            <a:endParaRPr lang="he-IL" sz="5400" b="1" spc="300">
               <a:solidFill>
                 <a:schemeClr val="bg1"/>
               </a:solidFill>
               <a:effectLst/>
-              <a:latin typeface="Handjet SemiBold Square Single" pitchFamily="2" charset="0"/>
+              <a:latin typeface="Handjet SemiBold Square Single"/>
               <a:ea typeface="3270 CONDENSED" panose="02000509000000000000" pitchFamily="49" charset="0"/>
               <a:cs typeface="Handjet SemiBold Square Single" pitchFamily="2" charset="0"/>
             </a:endParaRPr>
@@ -4562,7 +4573,7 @@
           <a:noFill/>
         </p:spPr>
         <p:txBody>
-          <a:bodyPr wrap="square" rtlCol="0">
+          <a:bodyPr wrap="square" lIns="91440" tIns="45720" rIns="91440" bIns="45720" rtlCol="0" anchor="t">
             <a:spAutoFit/>
           </a:bodyPr>
           <a:lstStyle/>
@@ -4572,19 +4583,17 @@
                 <a:solidFill>
                   <a:schemeClr val="bg1"/>
                 </a:solidFill>
-                <a:effectLst/>
-                <a:latin typeface="Handjet Square Single" pitchFamily="2" charset="0"/>
-                <a:cs typeface="Handjet Square Single" pitchFamily="2" charset="0"/>
+                <a:ea typeface="+mn-lt"/>
+                <a:cs typeface="+mn-lt"/>
               </a:rPr>
-              <a:t>June 2024</a:t>
-            </a:r>
-            <a:endParaRPr lang="he-IL" spc="100" dirty="0">
+              <a:t>Winter 2024/25</a:t>
+            </a:r>
+            <a:endParaRPr lang="en-US" spc="100" dirty="0">
               <a:solidFill>
-                <a:schemeClr val="bg1"/>
+                <a:srgbClr val="000000"/>
               </a:solidFill>
-              <a:effectLst/>
-              <a:latin typeface="Handjet Square Single" pitchFamily="2" charset="0"/>
-              <a:cs typeface="Handjet Square Single" pitchFamily="2" charset="0"/>
+              <a:ea typeface="+mn-lt"/>
+              <a:cs typeface="+mn-lt"/>
             </a:endParaRPr>
           </a:p>
         </p:txBody>
@@ -5116,6 +5125,781 @@
 </file>
 
 <file path=ppt/slides/slide11.xml><?xml version="1.0" encoding="utf-8"?>
+<p:sld xmlns:a="http://schemas.openxmlformats.org/drawingml/2006/main" xmlns:r="http://schemas.openxmlformats.org/officeDocument/2006/relationships" xmlns:p="http://schemas.openxmlformats.org/presentationml/2006/main">
+  <p:cSld>
+    <p:spTree>
+      <p:nvGrpSpPr>
+        <p:cNvPr id="1" name="">
+          <a:extLst>
+            <a:ext uri="{FF2B5EF4-FFF2-40B4-BE49-F238E27FC236}">
+              <a16:creationId xmlns:a16="http://schemas.microsoft.com/office/drawing/2014/main" id="{07B33925-9896-E903-9362-FACDF2DC78AB}"/>
+            </a:ext>
+          </a:extLst>
+        </p:cNvPr>
+        <p:cNvGrpSpPr/>
+        <p:nvPr/>
+      </p:nvGrpSpPr>
+      <p:grpSpPr>
+        <a:xfrm>
+          <a:off x="0" y="0"/>
+          <a:ext cx="0" cy="0"/>
+          <a:chOff x="0" y="0"/>
+          <a:chExt cx="0" cy="0"/>
+        </a:xfrm>
+      </p:grpSpPr>
+      <p:pic>
+        <p:nvPicPr>
+          <p:cNvPr id="5" name="Picture 4">
+            <a:extLst>
+              <a:ext uri="{FF2B5EF4-FFF2-40B4-BE49-F238E27FC236}">
+                <a16:creationId xmlns:a16="http://schemas.microsoft.com/office/drawing/2014/main" id="{776F93A1-4CF9-CD59-FC72-CC56074710C6}"/>
+              </a:ext>
+            </a:extLst>
+          </p:cNvPr>
+          <p:cNvPicPr>
+            <a:picLocks noChangeAspect="1"/>
+          </p:cNvPicPr>
+          <p:nvPr/>
+        </p:nvPicPr>
+        <p:blipFill>
+          <a:blip r:embed="rId2"/>
+          <a:stretch>
+            <a:fillRect/>
+          </a:stretch>
+        </p:blipFill>
+        <p:spPr>
+          <a:xfrm>
+            <a:off x="0" y="-9832"/>
+            <a:ext cx="12192000" cy="6858000"/>
+          </a:xfrm>
+          <a:prstGeom prst="rect">
+            <a:avLst/>
+          </a:prstGeom>
+        </p:spPr>
+      </p:pic>
+      <p:sp>
+        <p:nvSpPr>
+          <p:cNvPr id="6" name="Rectangle 5">
+            <a:extLst>
+              <a:ext uri="{FF2B5EF4-FFF2-40B4-BE49-F238E27FC236}">
+                <a16:creationId xmlns:a16="http://schemas.microsoft.com/office/drawing/2014/main" id="{7E05B52F-A6FF-D160-A94E-67F6623C2389}"/>
+              </a:ext>
+            </a:extLst>
+          </p:cNvPr>
+          <p:cNvSpPr/>
+          <p:nvPr/>
+        </p:nvSpPr>
+        <p:spPr>
+          <a:xfrm>
+            <a:off x="124358" y="138988"/>
+            <a:ext cx="11923775" cy="1302106"/>
+          </a:xfrm>
+          <a:prstGeom prst="rect">
+            <a:avLst/>
+          </a:prstGeom>
+          <a:solidFill>
+            <a:srgbClr val="24272C"/>
+          </a:solidFill>
+          <a:ln>
+            <a:noFill/>
+          </a:ln>
+        </p:spPr>
+        <p:style>
+          <a:lnRef idx="2">
+            <a:schemeClr val="accent1">
+              <a:shade val="15000"/>
+            </a:schemeClr>
+          </a:lnRef>
+          <a:fillRef idx="1">
+            <a:schemeClr val="accent1"/>
+          </a:fillRef>
+          <a:effectRef idx="0">
+            <a:schemeClr val="accent1"/>
+          </a:effectRef>
+          <a:fontRef idx="minor">
+            <a:schemeClr val="lt1"/>
+          </a:fontRef>
+        </p:style>
+        <p:txBody>
+          <a:bodyPr rtlCol="0" anchor="ctr"/>
+          <a:lstStyle/>
+          <a:p>
+            <a:pPr marL="0" algn="ctr" defTabSz="914400" rtl="0" eaLnBrk="1" latinLnBrk="0" hangingPunct="1"/>
+            <a:endParaRPr lang="en-IL" dirty="0"/>
+          </a:p>
+        </p:txBody>
+      </p:sp>
+      <p:cxnSp>
+        <p:nvCxnSpPr>
+          <p:cNvPr id="9" name="Straight Connector 8">
+            <a:extLst>
+              <a:ext uri="{FF2B5EF4-FFF2-40B4-BE49-F238E27FC236}">
+                <a16:creationId xmlns:a16="http://schemas.microsoft.com/office/drawing/2014/main" id="{04D4FC38-A28C-F96B-A37D-D9B5F970B186}"/>
+              </a:ext>
+            </a:extLst>
+          </p:cNvPr>
+          <p:cNvCxnSpPr/>
+          <p:nvPr/>
+        </p:nvCxnSpPr>
+        <p:spPr>
+          <a:xfrm>
+            <a:off x="124358" y="6217920"/>
+            <a:ext cx="11923775" cy="73152"/>
+          </a:xfrm>
+          <a:prstGeom prst="line">
+            <a:avLst/>
+          </a:prstGeom>
+          <a:ln>
+            <a:solidFill>
+              <a:srgbClr val="24272C"/>
+            </a:solidFill>
+          </a:ln>
+        </p:spPr>
+        <p:style>
+          <a:lnRef idx="1">
+            <a:schemeClr val="accent1"/>
+          </a:lnRef>
+          <a:fillRef idx="0">
+            <a:schemeClr val="accent1"/>
+          </a:fillRef>
+          <a:effectRef idx="0">
+            <a:schemeClr val="accent1"/>
+          </a:effectRef>
+          <a:fontRef idx="minor">
+            <a:schemeClr val="tx1"/>
+          </a:fontRef>
+        </p:style>
+      </p:cxnSp>
+      <p:sp>
+        <p:nvSpPr>
+          <p:cNvPr id="12" name="TextBox 11">
+            <a:extLst>
+              <a:ext uri="{FF2B5EF4-FFF2-40B4-BE49-F238E27FC236}">
+                <a16:creationId xmlns:a16="http://schemas.microsoft.com/office/drawing/2014/main" id="{EC0CF955-0A6C-CBB4-E085-B6E464940FE1}"/>
+              </a:ext>
+            </a:extLst>
+          </p:cNvPr>
+          <p:cNvSpPr txBox="1"/>
+          <p:nvPr/>
+        </p:nvSpPr>
+        <p:spPr>
+          <a:xfrm>
+            <a:off x="886794" y="587727"/>
+            <a:ext cx="7449961" cy="584775"/>
+          </a:xfrm>
+          <a:prstGeom prst="rect">
+            <a:avLst/>
+          </a:prstGeom>
+          <a:noFill/>
+        </p:spPr>
+        <p:txBody>
+          <a:bodyPr wrap="square" rtlCol="0">
+            <a:spAutoFit/>
+          </a:bodyPr>
+          <a:lstStyle/>
+          <a:p>
+            <a:pPr algn="l"/>
+            <a:r>
+              <a:rPr lang="en-US" sz="3200" b="1" dirty="0">
+                <a:solidFill>
+                  <a:srgbClr val="E2FE21"/>
+                </a:solidFill>
+                <a:effectLst/>
+                <a:latin typeface="Miriam Libre" pitchFamily="2" charset="-79"/>
+                <a:cs typeface="Miriam Libre" pitchFamily="2" charset="-79"/>
+              </a:rPr>
+              <a:t>Demo – </a:t>
+            </a:r>
+            <a:r>
+              <a:rPr lang="en-US" sz="3200" b="1" dirty="0">
+                <a:solidFill>
+                  <a:srgbClr val="E2FE21"/>
+                </a:solidFill>
+                <a:latin typeface="Miriam Libre" pitchFamily="2" charset="-79"/>
+                <a:cs typeface="Miriam Libre" pitchFamily="2" charset="-79"/>
+              </a:rPr>
+              <a:t>Reflected </a:t>
+            </a:r>
+            <a:r>
+              <a:rPr lang="en-US" sz="3200" b="1" dirty="0">
+                <a:solidFill>
+                  <a:srgbClr val="E2FE21"/>
+                </a:solidFill>
+                <a:effectLst/>
+                <a:latin typeface="Miriam Libre" pitchFamily="2" charset="-79"/>
+                <a:cs typeface="Miriam Libre" pitchFamily="2" charset="-79"/>
+              </a:rPr>
+              <a:t>XSS Challenge</a:t>
+            </a:r>
+            <a:endParaRPr lang="he-IL" sz="3200" b="1" dirty="0">
+              <a:solidFill>
+                <a:srgbClr val="E2FE21"/>
+              </a:solidFill>
+              <a:effectLst/>
+              <a:latin typeface="Miriam Libre" pitchFamily="2" charset="-79"/>
+              <a:cs typeface="Miriam Libre" pitchFamily="2" charset="-79"/>
+            </a:endParaRPr>
+          </a:p>
+        </p:txBody>
+      </p:sp>
+      <p:sp>
+        <p:nvSpPr>
+          <p:cNvPr id="13" name="TextBox 12">
+            <a:extLst>
+              <a:ext uri="{FF2B5EF4-FFF2-40B4-BE49-F238E27FC236}">
+                <a16:creationId xmlns:a16="http://schemas.microsoft.com/office/drawing/2014/main" id="{5522B6DA-9966-DA9A-3D25-F365851926CA}"/>
+              </a:ext>
+            </a:extLst>
+          </p:cNvPr>
+          <p:cNvSpPr txBox="1"/>
+          <p:nvPr/>
+        </p:nvSpPr>
+        <p:spPr>
+          <a:xfrm>
+            <a:off x="1477499" y="2062886"/>
+            <a:ext cx="8904751" cy="745076"/>
+          </a:xfrm>
+          <a:prstGeom prst="rect">
+            <a:avLst/>
+          </a:prstGeom>
+          <a:noFill/>
+        </p:spPr>
+        <p:txBody>
+          <a:bodyPr wrap="square" rtlCol="0">
+            <a:spAutoFit/>
+          </a:bodyPr>
+          <a:lstStyle/>
+          <a:p>
+            <a:pPr>
+              <a:lnSpc>
+                <a:spcPts val="2560"/>
+              </a:lnSpc>
+            </a:pPr>
+            <a:r>
+              <a:rPr lang="en-US" b="1" dirty="0">
+                <a:solidFill>
+                  <a:srgbClr val="24272B"/>
+                </a:solidFill>
+                <a:effectLst/>
+                <a:latin typeface="Miriam Libre" pitchFamily="2" charset="-79"/>
+                <a:cs typeface="Miriam Libre" pitchFamily="2" charset="-79"/>
+                <a:hlinkClick r:id="rId3"/>
+              </a:rPr>
+              <a:t>https://portswigger.net/web-security/cross-site-scripting/reflected/lab-html-context-nothing-encoded</a:t>
+            </a:r>
+            <a:endParaRPr lang="en-US" dirty="0">
+              <a:solidFill>
+                <a:srgbClr val="24272B"/>
+              </a:solidFill>
+              <a:latin typeface="Miriam Libre" pitchFamily="2" charset="-79"/>
+              <a:cs typeface="Miriam Libre" pitchFamily="2" charset="-79"/>
+            </a:endParaRPr>
+          </a:p>
+        </p:txBody>
+      </p:sp>
+      <p:pic>
+        <p:nvPicPr>
+          <p:cNvPr id="16" name="Picture 15">
+            <a:extLst>
+              <a:ext uri="{FF2B5EF4-FFF2-40B4-BE49-F238E27FC236}">
+                <a16:creationId xmlns:a16="http://schemas.microsoft.com/office/drawing/2014/main" id="{60E204A8-091D-EA73-7502-0C6CEE25C261}"/>
+              </a:ext>
+            </a:extLst>
+          </p:cNvPr>
+          <p:cNvPicPr>
+            <a:picLocks noChangeAspect="1"/>
+          </p:cNvPicPr>
+          <p:nvPr/>
+        </p:nvPicPr>
+        <p:blipFill>
+          <a:blip r:embed="rId4"/>
+          <a:srcRect/>
+          <a:stretch/>
+        </p:blipFill>
+        <p:spPr>
+          <a:xfrm>
+            <a:off x="8819329" y="6366654"/>
+            <a:ext cx="3079700" cy="243717"/>
+          </a:xfrm>
+          <a:prstGeom prst="rect">
+            <a:avLst/>
+          </a:prstGeom>
+        </p:spPr>
+      </p:pic>
+      <p:sp>
+        <p:nvSpPr>
+          <p:cNvPr id="2" name="TextBox 1">
+            <a:extLst>
+              <a:ext uri="{FF2B5EF4-FFF2-40B4-BE49-F238E27FC236}">
+                <a16:creationId xmlns:a16="http://schemas.microsoft.com/office/drawing/2014/main" id="{BA1C171C-6903-49A5-9041-1FE9156F181C}"/>
+              </a:ext>
+            </a:extLst>
+          </p:cNvPr>
+          <p:cNvSpPr txBox="1"/>
+          <p:nvPr/>
+        </p:nvSpPr>
+        <p:spPr>
+          <a:xfrm>
+            <a:off x="292971" y="6381880"/>
+            <a:ext cx="6097218" cy="276999"/>
+          </a:xfrm>
+          <a:prstGeom prst="rect">
+            <a:avLst/>
+          </a:prstGeom>
+          <a:noFill/>
+        </p:spPr>
+        <p:txBody>
+          <a:bodyPr wrap="square">
+            <a:spAutoFit/>
+          </a:bodyPr>
+          <a:lstStyle/>
+          <a:p>
+            <a:pPr marL="0" defTabSz="914400" eaLnBrk="1" latinLnBrk="0" hangingPunct="1"/>
+            <a:r>
+              <a:rPr lang="en-US" sz="1200" spc="30" dirty="0">
+                <a:solidFill>
+                  <a:srgbClr val="24272B"/>
+                </a:solidFill>
+                <a:effectLst/>
+                <a:latin typeface="Handjet Square Single" pitchFamily="2" charset="0"/>
+                <a:cs typeface="Handjet Square Single" pitchFamily="2" charset="0"/>
+              </a:rPr>
+              <a:t>02       Understanding Cross-Site Scripting (XSS)</a:t>
+            </a:r>
+          </a:p>
+        </p:txBody>
+      </p:sp>
+      <p:pic>
+        <p:nvPicPr>
+          <p:cNvPr id="4" name="Picture 3">
+            <a:extLst>
+              <a:ext uri="{FF2B5EF4-FFF2-40B4-BE49-F238E27FC236}">
+                <a16:creationId xmlns:a16="http://schemas.microsoft.com/office/drawing/2014/main" id="{422D7CD1-FE6A-2F3B-F3AF-89B5FB5740E2}"/>
+              </a:ext>
+            </a:extLst>
+          </p:cNvPr>
+          <p:cNvPicPr>
+            <a:picLocks noChangeAspect="1"/>
+          </p:cNvPicPr>
+          <p:nvPr/>
+        </p:nvPicPr>
+        <p:blipFill>
+          <a:blip r:embed="rId5"/>
+          <a:srcRect l="10492" t="3572" r="7732" b="30773"/>
+          <a:stretch/>
+        </p:blipFill>
+        <p:spPr>
+          <a:xfrm>
+            <a:off x="588569" y="2948010"/>
+            <a:ext cx="7090426" cy="3129861"/>
+          </a:xfrm>
+          <a:prstGeom prst="rect">
+            <a:avLst/>
+          </a:prstGeom>
+        </p:spPr>
+      </p:pic>
+    </p:spTree>
+    <p:extLst>
+      <p:ext uri="{BB962C8B-B14F-4D97-AF65-F5344CB8AC3E}">
+        <p14:creationId xmlns:p14="http://schemas.microsoft.com/office/powerpoint/2010/main" val="3741089510"/>
+      </p:ext>
+    </p:extLst>
+  </p:cSld>
+  <p:clrMapOvr>
+    <a:masterClrMapping/>
+  </p:clrMapOvr>
+</p:sld>
+</file>
+
+<file path=ppt/slides/slide12.xml><?xml version="1.0" encoding="utf-8"?>
+<p:sld xmlns:a="http://schemas.openxmlformats.org/drawingml/2006/main" xmlns:r="http://schemas.openxmlformats.org/officeDocument/2006/relationships" xmlns:p="http://schemas.openxmlformats.org/presentationml/2006/main">
+  <p:cSld>
+    <p:spTree>
+      <p:nvGrpSpPr>
+        <p:cNvPr id="1" name="">
+          <a:extLst>
+            <a:ext uri="{FF2B5EF4-FFF2-40B4-BE49-F238E27FC236}">
+              <a16:creationId xmlns:a16="http://schemas.microsoft.com/office/drawing/2014/main" id="{1E59E9EE-9967-3552-B952-01FC9AD3995E}"/>
+            </a:ext>
+          </a:extLst>
+        </p:cNvPr>
+        <p:cNvGrpSpPr/>
+        <p:nvPr/>
+      </p:nvGrpSpPr>
+      <p:grpSpPr>
+        <a:xfrm>
+          <a:off x="0" y="0"/>
+          <a:ext cx="0" cy="0"/>
+          <a:chOff x="0" y="0"/>
+          <a:chExt cx="0" cy="0"/>
+        </a:xfrm>
+      </p:grpSpPr>
+      <p:pic>
+        <p:nvPicPr>
+          <p:cNvPr id="5" name="Picture 4">
+            <a:extLst>
+              <a:ext uri="{FF2B5EF4-FFF2-40B4-BE49-F238E27FC236}">
+                <a16:creationId xmlns:a16="http://schemas.microsoft.com/office/drawing/2014/main" id="{ED9963D8-EE2F-3C6F-42C1-19300D9D8546}"/>
+              </a:ext>
+            </a:extLst>
+          </p:cNvPr>
+          <p:cNvPicPr>
+            <a:picLocks noChangeAspect="1"/>
+          </p:cNvPicPr>
+          <p:nvPr/>
+        </p:nvPicPr>
+        <p:blipFill>
+          <a:blip r:embed="rId2"/>
+          <a:stretch>
+            <a:fillRect/>
+          </a:stretch>
+        </p:blipFill>
+        <p:spPr>
+          <a:xfrm>
+            <a:off x="0" y="-9832"/>
+            <a:ext cx="12192000" cy="6858000"/>
+          </a:xfrm>
+          <a:prstGeom prst="rect">
+            <a:avLst/>
+          </a:prstGeom>
+        </p:spPr>
+      </p:pic>
+      <p:sp>
+        <p:nvSpPr>
+          <p:cNvPr id="6" name="Rectangle 5">
+            <a:extLst>
+              <a:ext uri="{FF2B5EF4-FFF2-40B4-BE49-F238E27FC236}">
+                <a16:creationId xmlns:a16="http://schemas.microsoft.com/office/drawing/2014/main" id="{4D206B15-82DB-7AE6-3029-058D3DB5E9C6}"/>
+              </a:ext>
+            </a:extLst>
+          </p:cNvPr>
+          <p:cNvSpPr/>
+          <p:nvPr/>
+        </p:nvSpPr>
+        <p:spPr>
+          <a:xfrm>
+            <a:off x="124358" y="138988"/>
+            <a:ext cx="11923775" cy="1302106"/>
+          </a:xfrm>
+          <a:prstGeom prst="rect">
+            <a:avLst/>
+          </a:prstGeom>
+          <a:solidFill>
+            <a:srgbClr val="24272C"/>
+          </a:solidFill>
+          <a:ln>
+            <a:noFill/>
+          </a:ln>
+        </p:spPr>
+        <p:style>
+          <a:lnRef idx="2">
+            <a:schemeClr val="accent1">
+              <a:shade val="15000"/>
+            </a:schemeClr>
+          </a:lnRef>
+          <a:fillRef idx="1">
+            <a:schemeClr val="accent1"/>
+          </a:fillRef>
+          <a:effectRef idx="0">
+            <a:schemeClr val="accent1"/>
+          </a:effectRef>
+          <a:fontRef idx="minor">
+            <a:schemeClr val="lt1"/>
+          </a:fontRef>
+        </p:style>
+        <p:txBody>
+          <a:bodyPr rtlCol="0" anchor="ctr"/>
+          <a:lstStyle/>
+          <a:p>
+            <a:pPr marL="0" algn="ctr" defTabSz="914400" rtl="0" eaLnBrk="1" latinLnBrk="0" hangingPunct="1"/>
+            <a:endParaRPr lang="en-IL" dirty="0"/>
+          </a:p>
+        </p:txBody>
+      </p:sp>
+      <p:cxnSp>
+        <p:nvCxnSpPr>
+          <p:cNvPr id="9" name="Straight Connector 8">
+            <a:extLst>
+              <a:ext uri="{FF2B5EF4-FFF2-40B4-BE49-F238E27FC236}">
+                <a16:creationId xmlns:a16="http://schemas.microsoft.com/office/drawing/2014/main" id="{C425CAF7-3BF3-5CEC-D5F2-8BBBDC7D3409}"/>
+              </a:ext>
+            </a:extLst>
+          </p:cNvPr>
+          <p:cNvCxnSpPr/>
+          <p:nvPr/>
+        </p:nvCxnSpPr>
+        <p:spPr>
+          <a:xfrm>
+            <a:off x="124358" y="6217920"/>
+            <a:ext cx="11923775" cy="73152"/>
+          </a:xfrm>
+          <a:prstGeom prst="line">
+            <a:avLst/>
+          </a:prstGeom>
+          <a:ln>
+            <a:solidFill>
+              <a:srgbClr val="24272C"/>
+            </a:solidFill>
+          </a:ln>
+        </p:spPr>
+        <p:style>
+          <a:lnRef idx="1">
+            <a:schemeClr val="accent1"/>
+          </a:lnRef>
+          <a:fillRef idx="0">
+            <a:schemeClr val="accent1"/>
+          </a:fillRef>
+          <a:effectRef idx="0">
+            <a:schemeClr val="accent1"/>
+          </a:effectRef>
+          <a:fontRef idx="minor">
+            <a:schemeClr val="tx1"/>
+          </a:fontRef>
+        </p:style>
+      </p:cxnSp>
+      <p:sp>
+        <p:nvSpPr>
+          <p:cNvPr id="12" name="TextBox 11">
+            <a:extLst>
+              <a:ext uri="{FF2B5EF4-FFF2-40B4-BE49-F238E27FC236}">
+                <a16:creationId xmlns:a16="http://schemas.microsoft.com/office/drawing/2014/main" id="{D3320323-B9BC-48C3-5731-DA497DE1AB3C}"/>
+              </a:ext>
+            </a:extLst>
+          </p:cNvPr>
+          <p:cNvSpPr txBox="1"/>
+          <p:nvPr/>
+        </p:nvSpPr>
+        <p:spPr>
+          <a:xfrm>
+            <a:off x="886794" y="587727"/>
+            <a:ext cx="7449961" cy="584775"/>
+          </a:xfrm>
+          <a:prstGeom prst="rect">
+            <a:avLst/>
+          </a:prstGeom>
+          <a:noFill/>
+        </p:spPr>
+        <p:txBody>
+          <a:bodyPr wrap="square" rtlCol="0">
+            <a:spAutoFit/>
+          </a:bodyPr>
+          <a:lstStyle/>
+          <a:p>
+            <a:pPr algn="l"/>
+            <a:r>
+              <a:rPr lang="en-US" sz="3200" b="1" dirty="0">
+                <a:solidFill>
+                  <a:srgbClr val="E2FE21"/>
+                </a:solidFill>
+                <a:effectLst/>
+                <a:latin typeface="Miriam Libre" pitchFamily="2" charset="-79"/>
+                <a:cs typeface="Miriam Libre" pitchFamily="2" charset="-79"/>
+              </a:rPr>
+              <a:t>Demo – </a:t>
+            </a:r>
+            <a:r>
+              <a:rPr lang="en-US" sz="3200" b="1" dirty="0">
+                <a:solidFill>
+                  <a:srgbClr val="E2FE21"/>
+                </a:solidFill>
+                <a:latin typeface="Miriam Libre" pitchFamily="2" charset="-79"/>
+                <a:cs typeface="Miriam Libre" pitchFamily="2" charset="-79"/>
+              </a:rPr>
+              <a:t>Stored </a:t>
+            </a:r>
+            <a:r>
+              <a:rPr lang="en-US" sz="3200" b="1" dirty="0">
+                <a:solidFill>
+                  <a:srgbClr val="E2FE21"/>
+                </a:solidFill>
+                <a:effectLst/>
+                <a:latin typeface="Miriam Libre" pitchFamily="2" charset="-79"/>
+                <a:cs typeface="Miriam Libre" pitchFamily="2" charset="-79"/>
+              </a:rPr>
+              <a:t>XSS Challenge</a:t>
+            </a:r>
+            <a:endParaRPr lang="he-IL" sz="3200" b="1" dirty="0">
+              <a:solidFill>
+                <a:srgbClr val="E2FE21"/>
+              </a:solidFill>
+              <a:effectLst/>
+              <a:latin typeface="Miriam Libre" pitchFamily="2" charset="-79"/>
+              <a:cs typeface="Miriam Libre" pitchFamily="2" charset="-79"/>
+            </a:endParaRPr>
+          </a:p>
+        </p:txBody>
+      </p:sp>
+      <p:sp>
+        <p:nvSpPr>
+          <p:cNvPr id="13" name="TextBox 12">
+            <a:extLst>
+              <a:ext uri="{FF2B5EF4-FFF2-40B4-BE49-F238E27FC236}">
+                <a16:creationId xmlns:a16="http://schemas.microsoft.com/office/drawing/2014/main" id="{74993854-1913-CB43-B47A-A3F3D74C45FB}"/>
+              </a:ext>
+            </a:extLst>
+          </p:cNvPr>
+          <p:cNvSpPr txBox="1"/>
+          <p:nvPr/>
+        </p:nvSpPr>
+        <p:spPr>
+          <a:xfrm>
+            <a:off x="1477499" y="2062886"/>
+            <a:ext cx="8904751" cy="745076"/>
+          </a:xfrm>
+          <a:prstGeom prst="rect">
+            <a:avLst/>
+          </a:prstGeom>
+          <a:noFill/>
+        </p:spPr>
+        <p:txBody>
+          <a:bodyPr wrap="square" rtlCol="0">
+            <a:spAutoFit/>
+          </a:bodyPr>
+          <a:lstStyle/>
+          <a:p>
+            <a:pPr>
+              <a:lnSpc>
+                <a:spcPts val="2560"/>
+              </a:lnSpc>
+            </a:pPr>
+            <a:r>
+              <a:rPr lang="en-US" b="1" dirty="0">
+                <a:solidFill>
+                  <a:srgbClr val="24272B"/>
+                </a:solidFill>
+                <a:effectLst/>
+                <a:latin typeface="Miriam Libre" pitchFamily="2" charset="-79"/>
+                <a:cs typeface="Miriam Libre" pitchFamily="2" charset="-79"/>
+                <a:hlinkClick r:id="rId3"/>
+              </a:rPr>
+              <a:t>https://portswigger.net/web-security/cross-site-scripting/stored/lab-html-context-nothing-encoded</a:t>
+            </a:r>
+            <a:endParaRPr lang="en-US" dirty="0">
+              <a:solidFill>
+                <a:srgbClr val="24272B"/>
+              </a:solidFill>
+              <a:latin typeface="Miriam Libre" pitchFamily="2" charset="-79"/>
+              <a:cs typeface="Miriam Libre" pitchFamily="2" charset="-79"/>
+            </a:endParaRPr>
+          </a:p>
+        </p:txBody>
+      </p:sp>
+      <p:pic>
+        <p:nvPicPr>
+          <p:cNvPr id="16" name="Picture 15">
+            <a:extLst>
+              <a:ext uri="{FF2B5EF4-FFF2-40B4-BE49-F238E27FC236}">
+                <a16:creationId xmlns:a16="http://schemas.microsoft.com/office/drawing/2014/main" id="{56C14688-F0D3-6542-B47E-4310E097B2A2}"/>
+              </a:ext>
+            </a:extLst>
+          </p:cNvPr>
+          <p:cNvPicPr>
+            <a:picLocks noChangeAspect="1"/>
+          </p:cNvPicPr>
+          <p:nvPr/>
+        </p:nvPicPr>
+        <p:blipFill>
+          <a:blip r:embed="rId4"/>
+          <a:srcRect/>
+          <a:stretch/>
+        </p:blipFill>
+        <p:spPr>
+          <a:xfrm>
+            <a:off x="8819329" y="6366654"/>
+            <a:ext cx="3079700" cy="243717"/>
+          </a:xfrm>
+          <a:prstGeom prst="rect">
+            <a:avLst/>
+          </a:prstGeom>
+        </p:spPr>
+      </p:pic>
+      <p:sp>
+        <p:nvSpPr>
+          <p:cNvPr id="2" name="TextBox 1">
+            <a:extLst>
+              <a:ext uri="{FF2B5EF4-FFF2-40B4-BE49-F238E27FC236}">
+                <a16:creationId xmlns:a16="http://schemas.microsoft.com/office/drawing/2014/main" id="{3F2CCC3C-6C2D-1BC3-3093-CA5C14B6CAE7}"/>
+              </a:ext>
+            </a:extLst>
+          </p:cNvPr>
+          <p:cNvSpPr txBox="1"/>
+          <p:nvPr/>
+        </p:nvSpPr>
+        <p:spPr>
+          <a:xfrm>
+            <a:off x="292971" y="6381880"/>
+            <a:ext cx="6097218" cy="276999"/>
+          </a:xfrm>
+          <a:prstGeom prst="rect">
+            <a:avLst/>
+          </a:prstGeom>
+          <a:noFill/>
+        </p:spPr>
+        <p:txBody>
+          <a:bodyPr wrap="square">
+            <a:spAutoFit/>
+          </a:bodyPr>
+          <a:lstStyle/>
+          <a:p>
+            <a:pPr marL="0" defTabSz="914400" eaLnBrk="1" latinLnBrk="0" hangingPunct="1"/>
+            <a:r>
+              <a:rPr lang="en-US" sz="1200" spc="30" dirty="0">
+                <a:solidFill>
+                  <a:srgbClr val="24272B"/>
+                </a:solidFill>
+                <a:effectLst/>
+                <a:latin typeface="Handjet Square Single" pitchFamily="2" charset="0"/>
+                <a:cs typeface="Handjet Square Single" pitchFamily="2" charset="0"/>
+              </a:rPr>
+              <a:t>02       Understanding Cross-Site Scripting (XSS)</a:t>
+            </a:r>
+          </a:p>
+        </p:txBody>
+      </p:sp>
+      <p:pic>
+        <p:nvPicPr>
+          <p:cNvPr id="4" name="Picture 3">
+            <a:extLst>
+              <a:ext uri="{FF2B5EF4-FFF2-40B4-BE49-F238E27FC236}">
+                <a16:creationId xmlns:a16="http://schemas.microsoft.com/office/drawing/2014/main" id="{449ACD97-4DF7-EF72-E4D4-C471771CB0DE}"/>
+              </a:ext>
+            </a:extLst>
+          </p:cNvPr>
+          <p:cNvPicPr>
+            <a:picLocks noChangeAspect="1"/>
+          </p:cNvPicPr>
+          <p:nvPr/>
+        </p:nvPicPr>
+        <p:blipFill>
+          <a:blip r:embed="rId5"/>
+          <a:stretch>
+            <a:fillRect/>
+          </a:stretch>
+        </p:blipFill>
+        <p:spPr>
+          <a:xfrm>
+            <a:off x="5929874" y="3147132"/>
+            <a:ext cx="5589034" cy="3068319"/>
+          </a:xfrm>
+          <a:prstGeom prst="rect">
+            <a:avLst/>
+          </a:prstGeom>
+        </p:spPr>
+      </p:pic>
+    </p:spTree>
+    <p:extLst>
+      <p:ext uri="{BB962C8B-B14F-4D97-AF65-F5344CB8AC3E}">
+        <p14:creationId xmlns:p14="http://schemas.microsoft.com/office/powerpoint/2010/main" val="3460650569"/>
+      </p:ext>
+    </p:extLst>
+  </p:cSld>
+  <p:clrMapOvr>
+    <a:masterClrMapping/>
+  </p:clrMapOvr>
+</p:sld>
+</file>
+
+<file path=ppt/slides/slide13.xml><?xml version="1.0" encoding="utf-8"?>
 <p:sld xmlns:a="http://schemas.openxmlformats.org/drawingml/2006/main" xmlns:r="http://schemas.openxmlformats.org/officeDocument/2006/relationships" xmlns:p="http://schemas.openxmlformats.org/presentationml/2006/main">
   <p:cSld>
     <p:spTree>
@@ -5574,7 +6358,7 @@
 </p:sld>
 </file>
 
-<file path=ppt/slides/slide12.xml><?xml version="1.0" encoding="utf-8"?>
+<file path=ppt/slides/slide14.xml><?xml version="1.0" encoding="utf-8"?>
 <p:sld xmlns:a="http://schemas.openxmlformats.org/drawingml/2006/main" xmlns:r="http://schemas.openxmlformats.org/officeDocument/2006/relationships" xmlns:p="http://schemas.openxmlformats.org/presentationml/2006/main">
   <p:cSld>
     <p:spTree>
@@ -6244,7 +7028,7 @@
 </p:sld>
 </file>
 
-<file path=ppt/slides/slide13.xml><?xml version="1.0" encoding="utf-8"?>
+<file path=ppt/slides/slide15.xml><?xml version="1.0" encoding="utf-8"?>
 <p:sld xmlns:a="http://schemas.openxmlformats.org/drawingml/2006/main" xmlns:r="http://schemas.openxmlformats.org/officeDocument/2006/relationships" xmlns:p="http://schemas.openxmlformats.org/presentationml/2006/main">
   <p:cSld>
     <p:spTree>
@@ -6996,7 +7780,17 @@
                 <a:latin typeface="Miriam Libre" pitchFamily="2" charset="-79"/>
                 <a:cs typeface="Miriam Libre" pitchFamily="2" charset="-79"/>
               </a:rPr>
-              <a:t>02</a:t>
+              <a:t>0</a:t>
+            </a:r>
+            <a:r>
+              <a:rPr lang="en-US" sz="1000" dirty="0">
+                <a:solidFill>
+                  <a:srgbClr val="E2FE21"/>
+                </a:solidFill>
+                <a:latin typeface="Miriam Libre" pitchFamily="2" charset="-79"/>
+                <a:cs typeface="Miriam Libre" pitchFamily="2" charset="-79"/>
+              </a:rPr>
+              <a:t>2</a:t>
             </a:r>
             <a:r>
               <a:rPr lang="en-US" sz="1000" dirty="0">

</xml_diff>